<commit_message>
minor changes in setup and changelog
</commit_message>
<xml_diff>
--- a/documentation/Changelog.pptx
+++ b/documentation/Changelog.pptx
@@ -10547,7 +10547,7 @@
             </p:custDataLst>
             <p:extLst>
               <p:ext uri="{D42A27DB-BD31-4B8C-83A1-F6EECF244321}">
-                <p14:modId xmlns:p14="http://schemas.microsoft.com/office/powerpoint/2010/main" val="544188150"/>
+                <p14:modId xmlns:p14="http://schemas.microsoft.com/office/powerpoint/2010/main" val="570750519"/>
               </p:ext>
             </p:extLst>
           </p:nvPr>
@@ -10595,6 +10595,704 @@
           </a:graphicData>
         </a:graphic>
       </p:graphicFrame>
+      <p:grpSp>
+        <p:nvGrpSpPr>
+          <p:cNvPr id="10" name="[BKT] Segmented Circle 10">
+            <a:extLst>
+              <a:ext uri="{FF2B5EF4-FFF2-40B4-BE49-F238E27FC236}">
+                <a16:creationId xmlns:a16="http://schemas.microsoft.com/office/drawing/2014/main" id="{C0C08428-DBC5-4410-B0A3-093DF0B26919}"/>
+              </a:ext>
+            </a:extLst>
+          </p:cNvPr>
+          <p:cNvGrpSpPr/>
+          <p:nvPr/>
+        </p:nvGrpSpPr>
+        <p:grpSpPr>
+          <a:xfrm>
+            <a:off x="662099" y="1554026"/>
+            <a:ext cx="1445493" cy="1445493"/>
+            <a:chOff x="1100000" y="1099999"/>
+            <a:chExt cx="2880000" cy="2880000"/>
+          </a:xfrm>
+        </p:grpSpPr>
+        <p:sp>
+          <p:nvSpPr>
+            <p:cNvPr id="3" name="Freihandform: Form 2">
+              <a:extLst>
+                <a:ext uri="{FF2B5EF4-FFF2-40B4-BE49-F238E27FC236}">
+                  <a16:creationId xmlns:a16="http://schemas.microsoft.com/office/drawing/2014/main" id="{146A057A-D66A-4A72-884E-F0DE2D7A92F7}"/>
+                </a:ext>
+              </a:extLst>
+            </p:cNvPr>
+            <p:cNvSpPr/>
+            <p:nvPr/>
+          </p:nvSpPr>
+          <p:spPr>
+            <a:xfrm>
+              <a:off x="2824241" y="2540000"/>
+              <a:ext cx="1155759" cy="1366548"/>
+            </a:xfrm>
+            <a:custGeom>
+              <a:avLst/>
+              <a:gdLst>
+                <a:gd name="connsiteX0" fmla="*/ 1168459 w 1168459"/>
+                <a:gd name="connsiteY0" fmla="*/ 0 h 1366548"/>
+                <a:gd name="connsiteX1" fmla="*/ 170753 w 1168459"/>
+                <a:gd name="connsiteY1" fmla="*/ 1366548 h 1366548"/>
+                <a:gd name="connsiteX2" fmla="*/ 0 w 1168459"/>
+                <a:gd name="connsiteY2" fmla="*/ 1233646 h 1366548"/>
+                <a:gd name="connsiteX3" fmla="*/ 57004 w 1168459"/>
+                <a:gd name="connsiteY3" fmla="*/ 1024911 h 1366548"/>
+                <a:gd name="connsiteX4" fmla="*/ 795759 w 1168459"/>
+                <a:gd name="connsiteY4" fmla="*/ 0 h 1366548"/>
+                <a:gd name="connsiteX5" fmla="*/ 975759 w 1168459"/>
+                <a:gd name="connsiteY5" fmla="*/ 120000 h 1366548"/>
+                <a:gd name="connsiteX0" fmla="*/ 1155759 w 1155759"/>
+                <a:gd name="connsiteY0" fmla="*/ 0 h 1366548"/>
+                <a:gd name="connsiteX1" fmla="*/ 170753 w 1155759"/>
+                <a:gd name="connsiteY1" fmla="*/ 1366548 h 1366548"/>
+                <a:gd name="connsiteX2" fmla="*/ 0 w 1155759"/>
+                <a:gd name="connsiteY2" fmla="*/ 1233646 h 1366548"/>
+                <a:gd name="connsiteX3" fmla="*/ 57004 w 1155759"/>
+                <a:gd name="connsiteY3" fmla="*/ 1024911 h 1366548"/>
+                <a:gd name="connsiteX4" fmla="*/ 795759 w 1155759"/>
+                <a:gd name="connsiteY4" fmla="*/ 0 h 1366548"/>
+                <a:gd name="connsiteX5" fmla="*/ 975759 w 1155759"/>
+                <a:gd name="connsiteY5" fmla="*/ 120000 h 1366548"/>
+              </a:gdLst>
+              <a:ahLst/>
+              <a:cxnLst>
+                <a:cxn ang="0">
+                  <a:pos x="connsiteX0" y="connsiteY0"/>
+                </a:cxn>
+                <a:cxn ang="0">
+                  <a:pos x="connsiteX1" y="connsiteY1"/>
+                </a:cxn>
+                <a:cxn ang="0">
+                  <a:pos x="connsiteX2" y="connsiteY2"/>
+                </a:cxn>
+                <a:cxn ang="0">
+                  <a:pos x="connsiteX3" y="connsiteY3"/>
+                </a:cxn>
+                <a:cxn ang="0">
+                  <a:pos x="connsiteX4" y="connsiteY4"/>
+                </a:cxn>
+                <a:cxn ang="0">
+                  <a:pos x="connsiteX5" y="connsiteY5"/>
+                </a:cxn>
+              </a:cxnLst>
+              <a:rect l="l" t="t" r="r" b="b"/>
+              <a:pathLst>
+                <a:path w="1155759" h="1366548">
+                  <a:moveTo>
+                    <a:pt x="1155759" y="0"/>
+                  </a:moveTo>
+                  <a:cubicBezTo>
+                    <a:pt x="1155759" y="635904"/>
+                    <a:pt x="742882" y="1175962"/>
+                    <a:pt x="170753" y="1366548"/>
+                  </a:cubicBezTo>
+                  <a:lnTo>
+                    <a:pt x="0" y="1233646"/>
+                  </a:lnTo>
+                  <a:lnTo>
+                    <a:pt x="57004" y="1024911"/>
+                  </a:lnTo>
+                  <a:cubicBezTo>
+                    <a:pt x="486102" y="881971"/>
+                    <a:pt x="795759" y="476928"/>
+                    <a:pt x="795759" y="0"/>
+                  </a:cubicBezTo>
+                  <a:lnTo>
+                    <a:pt x="975759" y="120000"/>
+                  </a:lnTo>
+                  <a:close/>
+                </a:path>
+              </a:pathLst>
+            </a:custGeom>
+          </p:spPr>
+          <p:style>
+            <a:lnRef idx="2">
+              <a:schemeClr val="accent1">
+                <a:shade val="50000"/>
+              </a:schemeClr>
+            </a:lnRef>
+            <a:fillRef idx="1">
+              <a:schemeClr val="accent1"/>
+            </a:fillRef>
+            <a:effectRef idx="0">
+              <a:schemeClr val="accent1"/>
+            </a:effectRef>
+            <a:fontRef idx="minor">
+              <a:schemeClr val="lt1"/>
+            </a:fontRef>
+          </p:style>
+          <p:txBody>
+            <a:bodyPr rtlCol="0" anchor="ctr"/>
+            <a:lstStyle/>
+            <a:p>
+              <a:pPr algn="ctr"/>
+              <a:endParaRPr lang="en-US"/>
+            </a:p>
+          </p:txBody>
+        </p:sp>
+        <p:sp>
+          <p:nvSpPr>
+            <p:cNvPr id="6" name="Freihandform: Form 5">
+              <a:extLst>
+                <a:ext uri="{FF2B5EF4-FFF2-40B4-BE49-F238E27FC236}">
+                  <a16:creationId xmlns:a16="http://schemas.microsoft.com/office/drawing/2014/main" id="{D825D329-BAA6-423C-A85B-2BC14DEDD130}"/>
+                </a:ext>
+              </a:extLst>
+            </p:cNvPr>
+            <p:cNvSpPr/>
+            <p:nvPr/>
+          </p:nvSpPr>
+          <p:spPr>
+            <a:xfrm>
+              <a:off x="1377955" y="3177700"/>
+              <a:ext cx="1617039" cy="802299"/>
+            </a:xfrm>
+            <a:custGeom>
+              <a:avLst/>
+              <a:gdLst>
+                <a:gd name="connsiteX0" fmla="*/ 1629739 w 1629739"/>
+                <a:gd name="connsiteY0" fmla="*/ 728847 h 802299"/>
+                <a:gd name="connsiteX1" fmla="*/ 1162045 w 1629739"/>
+                <a:gd name="connsiteY1" fmla="*/ 802299 h 802299"/>
+                <a:gd name="connsiteX2" fmla="*/ 0 w 1629739"/>
+                <a:gd name="connsiteY2" fmla="*/ 212567 h 802299"/>
+                <a:gd name="connsiteX3" fmla="*/ 74400 w 1629739"/>
+                <a:gd name="connsiteY3" fmla="*/ 9447 h 802299"/>
+                <a:gd name="connsiteX4" fmla="*/ 290511 w 1629739"/>
+                <a:gd name="connsiteY4" fmla="*/ 0 h 802299"/>
+                <a:gd name="connsiteX5" fmla="*/ 1162045 w 1629739"/>
+                <a:gd name="connsiteY5" fmla="*/ 442299 h 802299"/>
+                <a:gd name="connsiteX6" fmla="*/ 1503290 w 1629739"/>
+                <a:gd name="connsiteY6" fmla="*/ 387210 h 802299"/>
+                <a:gd name="connsiteX7" fmla="*/ 1446286 w 1629739"/>
+                <a:gd name="connsiteY7" fmla="*/ 595945 h 802299"/>
+                <a:gd name="connsiteX0" fmla="*/ 1617039 w 1617039"/>
+                <a:gd name="connsiteY0" fmla="*/ 728848 h 802299"/>
+                <a:gd name="connsiteX1" fmla="*/ 1162045 w 1617039"/>
+                <a:gd name="connsiteY1" fmla="*/ 802299 h 802299"/>
+                <a:gd name="connsiteX2" fmla="*/ 0 w 1617039"/>
+                <a:gd name="connsiteY2" fmla="*/ 212567 h 802299"/>
+                <a:gd name="connsiteX3" fmla="*/ 74400 w 1617039"/>
+                <a:gd name="connsiteY3" fmla="*/ 9447 h 802299"/>
+                <a:gd name="connsiteX4" fmla="*/ 290511 w 1617039"/>
+                <a:gd name="connsiteY4" fmla="*/ 0 h 802299"/>
+                <a:gd name="connsiteX5" fmla="*/ 1162045 w 1617039"/>
+                <a:gd name="connsiteY5" fmla="*/ 442299 h 802299"/>
+                <a:gd name="connsiteX6" fmla="*/ 1503290 w 1617039"/>
+                <a:gd name="connsiteY6" fmla="*/ 387210 h 802299"/>
+                <a:gd name="connsiteX7" fmla="*/ 1446286 w 1617039"/>
+                <a:gd name="connsiteY7" fmla="*/ 595945 h 802299"/>
+              </a:gdLst>
+              <a:ahLst/>
+              <a:cxnLst>
+                <a:cxn ang="0">
+                  <a:pos x="connsiteX0" y="connsiteY0"/>
+                </a:cxn>
+                <a:cxn ang="0">
+                  <a:pos x="connsiteX1" y="connsiteY1"/>
+                </a:cxn>
+                <a:cxn ang="0">
+                  <a:pos x="connsiteX2" y="connsiteY2"/>
+                </a:cxn>
+                <a:cxn ang="0">
+                  <a:pos x="connsiteX3" y="connsiteY3"/>
+                </a:cxn>
+                <a:cxn ang="0">
+                  <a:pos x="connsiteX4" y="connsiteY4"/>
+                </a:cxn>
+                <a:cxn ang="0">
+                  <a:pos x="connsiteX5" y="connsiteY5"/>
+                </a:cxn>
+                <a:cxn ang="0">
+                  <a:pos x="connsiteX6" y="connsiteY6"/>
+                </a:cxn>
+                <a:cxn ang="0">
+                  <a:pos x="connsiteX7" y="connsiteY7"/>
+                </a:cxn>
+              </a:cxnLst>
+              <a:rect l="l" t="t" r="r" b="b"/>
+              <a:pathLst>
+                <a:path w="1617039" h="802299">
+                  <a:moveTo>
+                    <a:pt x="1617039" y="728848"/>
+                  </a:moveTo>
+                  <a:cubicBezTo>
+                    <a:pt x="1474007" y="776494"/>
+                    <a:pt x="1321021" y="802299"/>
+                    <a:pt x="1162045" y="802299"/>
+                  </a:cubicBezTo>
+                  <a:cubicBezTo>
+                    <a:pt x="685117" y="802299"/>
+                    <a:pt x="262103" y="570056"/>
+                    <a:pt x="0" y="212567"/>
+                  </a:cubicBezTo>
+                  <a:lnTo>
+                    <a:pt x="74400" y="9447"/>
+                  </a:lnTo>
+                  <a:lnTo>
+                    <a:pt x="290511" y="0"/>
+                  </a:lnTo>
+                  <a:cubicBezTo>
+                    <a:pt x="487088" y="268117"/>
+                    <a:pt x="804349" y="442299"/>
+                    <a:pt x="1162045" y="442299"/>
+                  </a:cubicBezTo>
+                  <a:cubicBezTo>
+                    <a:pt x="1281277" y="442299"/>
+                    <a:pt x="1396016" y="422945"/>
+                    <a:pt x="1503290" y="387210"/>
+                  </a:cubicBezTo>
+                  <a:lnTo>
+                    <a:pt x="1446286" y="595945"/>
+                  </a:lnTo>
+                  <a:close/>
+                </a:path>
+              </a:pathLst>
+            </a:custGeom>
+          </p:spPr>
+          <p:style>
+            <a:lnRef idx="2">
+              <a:schemeClr val="accent1">
+                <a:shade val="50000"/>
+              </a:schemeClr>
+            </a:lnRef>
+            <a:fillRef idx="1">
+              <a:schemeClr val="accent1"/>
+            </a:fillRef>
+            <a:effectRef idx="0">
+              <a:schemeClr val="accent1"/>
+            </a:effectRef>
+            <a:fontRef idx="minor">
+              <a:schemeClr val="lt1"/>
+            </a:fontRef>
+          </p:style>
+          <p:txBody>
+            <a:bodyPr rtlCol="0" anchor="ctr"/>
+            <a:lstStyle/>
+            <a:p>
+              <a:pPr algn="ctr"/>
+              <a:endParaRPr lang="en-US"/>
+            </a:p>
+          </p:txBody>
+        </p:sp>
+        <p:sp>
+          <p:nvSpPr>
+            <p:cNvPr id="7" name="Freihandform: Form 6">
+              <a:extLst>
+                <a:ext uri="{FF2B5EF4-FFF2-40B4-BE49-F238E27FC236}">
+                  <a16:creationId xmlns:a16="http://schemas.microsoft.com/office/drawing/2014/main" id="{FC614CD9-AD9E-40A7-A3A6-AE140D23E3D5}"/>
+                </a:ext>
+              </a:extLst>
+            </p:cNvPr>
+            <p:cNvSpPr/>
+            <p:nvPr/>
+          </p:nvSpPr>
+          <p:spPr>
+            <a:xfrm>
+              <a:off x="1100000" y="1689732"/>
+              <a:ext cx="568466" cy="1700536"/>
+            </a:xfrm>
+            <a:custGeom>
+              <a:avLst/>
+              <a:gdLst>
+                <a:gd name="connsiteX0" fmla="*/ 290655 w 568466"/>
+                <a:gd name="connsiteY0" fmla="*/ 1700536 h 1700536"/>
+                <a:gd name="connsiteX1" fmla="*/ 0 w 568466"/>
+                <a:gd name="connsiteY1" fmla="*/ 850268 h 1700536"/>
+                <a:gd name="connsiteX2" fmla="*/ 277955 w 568466"/>
+                <a:gd name="connsiteY2" fmla="*/ 0 h 1700536"/>
+                <a:gd name="connsiteX3" fmla="*/ 494066 w 568466"/>
+                <a:gd name="connsiteY3" fmla="*/ 9446 h 1700536"/>
+                <a:gd name="connsiteX4" fmla="*/ 568466 w 568466"/>
+                <a:gd name="connsiteY4" fmla="*/ 212567 h 1700536"/>
+                <a:gd name="connsiteX5" fmla="*/ 360000 w 568466"/>
+                <a:gd name="connsiteY5" fmla="*/ 850268 h 1700536"/>
+                <a:gd name="connsiteX6" fmla="*/ 568466 w 568466"/>
+                <a:gd name="connsiteY6" fmla="*/ 1487969 h 1700536"/>
+                <a:gd name="connsiteX7" fmla="*/ 352355 w 568466"/>
+                <a:gd name="connsiteY7" fmla="*/ 1497416 h 1700536"/>
+                <a:gd name="connsiteX0" fmla="*/ 277955 w 568466"/>
+                <a:gd name="connsiteY0" fmla="*/ 1700536 h 1700536"/>
+                <a:gd name="connsiteX1" fmla="*/ 0 w 568466"/>
+                <a:gd name="connsiteY1" fmla="*/ 850268 h 1700536"/>
+                <a:gd name="connsiteX2" fmla="*/ 277955 w 568466"/>
+                <a:gd name="connsiteY2" fmla="*/ 0 h 1700536"/>
+                <a:gd name="connsiteX3" fmla="*/ 494066 w 568466"/>
+                <a:gd name="connsiteY3" fmla="*/ 9446 h 1700536"/>
+                <a:gd name="connsiteX4" fmla="*/ 568466 w 568466"/>
+                <a:gd name="connsiteY4" fmla="*/ 212567 h 1700536"/>
+                <a:gd name="connsiteX5" fmla="*/ 360000 w 568466"/>
+                <a:gd name="connsiteY5" fmla="*/ 850268 h 1700536"/>
+                <a:gd name="connsiteX6" fmla="*/ 568466 w 568466"/>
+                <a:gd name="connsiteY6" fmla="*/ 1487969 h 1700536"/>
+                <a:gd name="connsiteX7" fmla="*/ 352355 w 568466"/>
+                <a:gd name="connsiteY7" fmla="*/ 1497416 h 1700536"/>
+              </a:gdLst>
+              <a:ahLst/>
+              <a:cxnLst>
+                <a:cxn ang="0">
+                  <a:pos x="connsiteX0" y="connsiteY0"/>
+                </a:cxn>
+                <a:cxn ang="0">
+                  <a:pos x="connsiteX1" y="connsiteY1"/>
+                </a:cxn>
+                <a:cxn ang="0">
+                  <a:pos x="connsiteX2" y="connsiteY2"/>
+                </a:cxn>
+                <a:cxn ang="0">
+                  <a:pos x="connsiteX3" y="connsiteY3"/>
+                </a:cxn>
+                <a:cxn ang="0">
+                  <a:pos x="connsiteX4" y="connsiteY4"/>
+                </a:cxn>
+                <a:cxn ang="0">
+                  <a:pos x="connsiteX5" y="connsiteY5"/>
+                </a:cxn>
+                <a:cxn ang="0">
+                  <a:pos x="connsiteX6" y="connsiteY6"/>
+                </a:cxn>
+                <a:cxn ang="0">
+                  <a:pos x="connsiteX7" y="connsiteY7"/>
+                </a:cxn>
+              </a:cxnLst>
+              <a:rect l="l" t="t" r="r" b="b"/>
+              <a:pathLst>
+                <a:path w="568466" h="1700536">
+                  <a:moveTo>
+                    <a:pt x="277955" y="1700536"/>
+                  </a:moveTo>
+                  <a:cubicBezTo>
+                    <a:pt x="103219" y="1462210"/>
+                    <a:pt x="0" y="1168220"/>
+                    <a:pt x="0" y="850268"/>
+                  </a:cubicBezTo>
+                  <a:cubicBezTo>
+                    <a:pt x="0" y="532316"/>
+                    <a:pt x="103219" y="238326"/>
+                    <a:pt x="277955" y="0"/>
+                  </a:cubicBezTo>
+                  <a:lnTo>
+                    <a:pt x="494066" y="9446"/>
+                  </a:lnTo>
+                  <a:lnTo>
+                    <a:pt x="568466" y="212567"/>
+                  </a:lnTo>
+                  <a:cubicBezTo>
+                    <a:pt x="437414" y="391311"/>
+                    <a:pt x="360000" y="611804"/>
+                    <a:pt x="360000" y="850268"/>
+                  </a:cubicBezTo>
+                  <a:cubicBezTo>
+                    <a:pt x="360000" y="1088732"/>
+                    <a:pt x="437414" y="1309225"/>
+                    <a:pt x="568466" y="1487969"/>
+                  </a:cubicBezTo>
+                  <a:lnTo>
+                    <a:pt x="352355" y="1497416"/>
+                  </a:lnTo>
+                  <a:close/>
+                </a:path>
+              </a:pathLst>
+            </a:custGeom>
+          </p:spPr>
+          <p:style>
+            <a:lnRef idx="2">
+              <a:schemeClr val="accent1">
+                <a:shade val="50000"/>
+              </a:schemeClr>
+            </a:lnRef>
+            <a:fillRef idx="1">
+              <a:schemeClr val="accent1"/>
+            </a:fillRef>
+            <a:effectRef idx="0">
+              <a:schemeClr val="accent1"/>
+            </a:effectRef>
+            <a:fontRef idx="minor">
+              <a:schemeClr val="lt1"/>
+            </a:fontRef>
+          </p:style>
+          <p:txBody>
+            <a:bodyPr rtlCol="0" anchor="ctr"/>
+            <a:lstStyle/>
+            <a:p>
+              <a:pPr algn="ctr"/>
+              <a:endParaRPr lang="en-US"/>
+            </a:p>
+          </p:txBody>
+        </p:sp>
+        <p:sp>
+          <p:nvSpPr>
+            <p:cNvPr id="8" name="Freihandform: Form 7">
+              <a:extLst>
+                <a:ext uri="{FF2B5EF4-FFF2-40B4-BE49-F238E27FC236}">
+                  <a16:creationId xmlns:a16="http://schemas.microsoft.com/office/drawing/2014/main" id="{11101BBC-6028-44CA-B599-28DFB31A33BA}"/>
+                </a:ext>
+              </a:extLst>
+            </p:cNvPr>
+            <p:cNvSpPr/>
+            <p:nvPr/>
+          </p:nvSpPr>
+          <p:spPr>
+            <a:xfrm>
+              <a:off x="1377955" y="1099999"/>
+              <a:ext cx="1674044" cy="802299"/>
+            </a:xfrm>
+            <a:custGeom>
+              <a:avLst/>
+              <a:gdLst>
+                <a:gd name="connsiteX0" fmla="*/ 0 w 1661344"/>
+                <a:gd name="connsiteY0" fmla="*/ 589732 h 802299"/>
+                <a:gd name="connsiteX1" fmla="*/ 1149345 w 1661344"/>
+                <a:gd name="connsiteY1" fmla="*/ 0 h 802299"/>
+                <a:gd name="connsiteX2" fmla="*/ 1604339 w 1661344"/>
+                <a:gd name="connsiteY2" fmla="*/ 73452 h 802299"/>
+                <a:gd name="connsiteX3" fmla="*/ 1661344 w 1661344"/>
+                <a:gd name="connsiteY3" fmla="*/ 282186 h 802299"/>
+                <a:gd name="connsiteX4" fmla="*/ 1490590 w 1661344"/>
+                <a:gd name="connsiteY4" fmla="*/ 415089 h 802299"/>
+                <a:gd name="connsiteX5" fmla="*/ 1149345 w 1661344"/>
+                <a:gd name="connsiteY5" fmla="*/ 360000 h 802299"/>
+                <a:gd name="connsiteX6" fmla="*/ 277811 w 1661344"/>
+                <a:gd name="connsiteY6" fmla="*/ 802299 h 802299"/>
+                <a:gd name="connsiteX7" fmla="*/ 203411 w 1661344"/>
+                <a:gd name="connsiteY7" fmla="*/ 599178 h 802299"/>
+                <a:gd name="connsiteX0" fmla="*/ 0 w 1674044"/>
+                <a:gd name="connsiteY0" fmla="*/ 589733 h 802299"/>
+                <a:gd name="connsiteX1" fmla="*/ 1162045 w 1674044"/>
+                <a:gd name="connsiteY1" fmla="*/ 0 h 802299"/>
+                <a:gd name="connsiteX2" fmla="*/ 1617039 w 1674044"/>
+                <a:gd name="connsiteY2" fmla="*/ 73452 h 802299"/>
+                <a:gd name="connsiteX3" fmla="*/ 1674044 w 1674044"/>
+                <a:gd name="connsiteY3" fmla="*/ 282186 h 802299"/>
+                <a:gd name="connsiteX4" fmla="*/ 1503290 w 1674044"/>
+                <a:gd name="connsiteY4" fmla="*/ 415089 h 802299"/>
+                <a:gd name="connsiteX5" fmla="*/ 1162045 w 1674044"/>
+                <a:gd name="connsiteY5" fmla="*/ 360000 h 802299"/>
+                <a:gd name="connsiteX6" fmla="*/ 290511 w 1674044"/>
+                <a:gd name="connsiteY6" fmla="*/ 802299 h 802299"/>
+                <a:gd name="connsiteX7" fmla="*/ 216111 w 1674044"/>
+                <a:gd name="connsiteY7" fmla="*/ 599178 h 802299"/>
+              </a:gdLst>
+              <a:ahLst/>
+              <a:cxnLst>
+                <a:cxn ang="0">
+                  <a:pos x="connsiteX0" y="connsiteY0"/>
+                </a:cxn>
+                <a:cxn ang="0">
+                  <a:pos x="connsiteX1" y="connsiteY1"/>
+                </a:cxn>
+                <a:cxn ang="0">
+                  <a:pos x="connsiteX2" y="connsiteY2"/>
+                </a:cxn>
+                <a:cxn ang="0">
+                  <a:pos x="connsiteX3" y="connsiteY3"/>
+                </a:cxn>
+                <a:cxn ang="0">
+                  <a:pos x="connsiteX4" y="connsiteY4"/>
+                </a:cxn>
+                <a:cxn ang="0">
+                  <a:pos x="connsiteX5" y="connsiteY5"/>
+                </a:cxn>
+                <a:cxn ang="0">
+                  <a:pos x="connsiteX6" y="connsiteY6"/>
+                </a:cxn>
+                <a:cxn ang="0">
+                  <a:pos x="connsiteX7" y="connsiteY7"/>
+                </a:cxn>
+              </a:cxnLst>
+              <a:rect l="l" t="t" r="r" b="b"/>
+              <a:pathLst>
+                <a:path w="1674044" h="802299">
+                  <a:moveTo>
+                    <a:pt x="0" y="589733"/>
+                  </a:moveTo>
+                  <a:cubicBezTo>
+                    <a:pt x="262103" y="232243"/>
+                    <a:pt x="685117" y="0"/>
+                    <a:pt x="1162045" y="0"/>
+                  </a:cubicBezTo>
+                  <a:cubicBezTo>
+                    <a:pt x="1321021" y="0"/>
+                    <a:pt x="1474007" y="25805"/>
+                    <a:pt x="1617039" y="73452"/>
+                  </a:cubicBezTo>
+                  <a:lnTo>
+                    <a:pt x="1674044" y="282186"/>
+                  </a:lnTo>
+                  <a:lnTo>
+                    <a:pt x="1503290" y="415089"/>
+                  </a:lnTo>
+                  <a:cubicBezTo>
+                    <a:pt x="1396016" y="379354"/>
+                    <a:pt x="1281277" y="360000"/>
+                    <a:pt x="1162045" y="360000"/>
+                  </a:cubicBezTo>
+                  <a:cubicBezTo>
+                    <a:pt x="804349" y="360000"/>
+                    <a:pt x="487088" y="534182"/>
+                    <a:pt x="290511" y="802299"/>
+                  </a:cubicBezTo>
+                  <a:lnTo>
+                    <a:pt x="216111" y="599178"/>
+                  </a:lnTo>
+                  <a:close/>
+                </a:path>
+              </a:pathLst>
+            </a:custGeom>
+          </p:spPr>
+          <p:style>
+            <a:lnRef idx="2">
+              <a:schemeClr val="accent1">
+                <a:shade val="50000"/>
+              </a:schemeClr>
+            </a:lnRef>
+            <a:fillRef idx="1">
+              <a:schemeClr val="accent1"/>
+            </a:fillRef>
+            <a:effectRef idx="0">
+              <a:schemeClr val="accent1"/>
+            </a:effectRef>
+            <a:fontRef idx="minor">
+              <a:schemeClr val="lt1"/>
+            </a:fontRef>
+          </p:style>
+          <p:txBody>
+            <a:bodyPr rtlCol="0" anchor="ctr"/>
+            <a:lstStyle/>
+            <a:p>
+              <a:pPr algn="ctr"/>
+              <a:endParaRPr lang="en-US"/>
+            </a:p>
+          </p:txBody>
+        </p:sp>
+        <p:sp>
+          <p:nvSpPr>
+            <p:cNvPr id="9" name="Freihandform: Form 8">
+              <a:extLst>
+                <a:ext uri="{FF2B5EF4-FFF2-40B4-BE49-F238E27FC236}">
+                  <a16:creationId xmlns:a16="http://schemas.microsoft.com/office/drawing/2014/main" id="{36618F16-1C10-4278-8F62-BEDC532C4384}"/>
+                </a:ext>
+              </a:extLst>
+            </p:cNvPr>
+            <p:cNvSpPr/>
+            <p:nvPr/>
+          </p:nvSpPr>
+          <p:spPr>
+            <a:xfrm>
+              <a:off x="2881244" y="1173452"/>
+              <a:ext cx="1098755" cy="1486548"/>
+            </a:xfrm>
+            <a:custGeom>
+              <a:avLst/>
+              <a:gdLst>
+                <a:gd name="connsiteX0" fmla="*/ 126449 w 1098755"/>
+                <a:gd name="connsiteY0" fmla="*/ 0 h 1486548"/>
+                <a:gd name="connsiteX1" fmla="*/ 1098755 w 1098755"/>
+                <a:gd name="connsiteY1" fmla="*/ 1366548 h 1486548"/>
+                <a:gd name="connsiteX2" fmla="*/ 918755 w 1098755"/>
+                <a:gd name="connsiteY2" fmla="*/ 1486548 h 1486548"/>
+                <a:gd name="connsiteX3" fmla="*/ 738755 w 1098755"/>
+                <a:gd name="connsiteY3" fmla="*/ 1366548 h 1486548"/>
+                <a:gd name="connsiteX4" fmla="*/ 0 w 1098755"/>
+                <a:gd name="connsiteY4" fmla="*/ 341637 h 1486548"/>
+                <a:gd name="connsiteX5" fmla="*/ 170754 w 1098755"/>
+                <a:gd name="connsiteY5" fmla="*/ 208734 h 1486548"/>
+                <a:gd name="connsiteX0" fmla="*/ 113750 w 1098755"/>
+                <a:gd name="connsiteY0" fmla="*/ 0 h 1486548"/>
+                <a:gd name="connsiteX1" fmla="*/ 1098755 w 1098755"/>
+                <a:gd name="connsiteY1" fmla="*/ 1366548 h 1486548"/>
+                <a:gd name="connsiteX2" fmla="*/ 918755 w 1098755"/>
+                <a:gd name="connsiteY2" fmla="*/ 1486548 h 1486548"/>
+                <a:gd name="connsiteX3" fmla="*/ 738755 w 1098755"/>
+                <a:gd name="connsiteY3" fmla="*/ 1366548 h 1486548"/>
+                <a:gd name="connsiteX4" fmla="*/ 0 w 1098755"/>
+                <a:gd name="connsiteY4" fmla="*/ 341637 h 1486548"/>
+                <a:gd name="connsiteX5" fmla="*/ 170754 w 1098755"/>
+                <a:gd name="connsiteY5" fmla="*/ 208734 h 1486548"/>
+              </a:gdLst>
+              <a:ahLst/>
+              <a:cxnLst>
+                <a:cxn ang="0">
+                  <a:pos x="connsiteX0" y="connsiteY0"/>
+                </a:cxn>
+                <a:cxn ang="0">
+                  <a:pos x="connsiteX1" y="connsiteY1"/>
+                </a:cxn>
+                <a:cxn ang="0">
+                  <a:pos x="connsiteX2" y="connsiteY2"/>
+                </a:cxn>
+                <a:cxn ang="0">
+                  <a:pos x="connsiteX3" y="connsiteY3"/>
+                </a:cxn>
+                <a:cxn ang="0">
+                  <a:pos x="connsiteX4" y="connsiteY4"/>
+                </a:cxn>
+                <a:cxn ang="0">
+                  <a:pos x="connsiteX5" y="connsiteY5"/>
+                </a:cxn>
+              </a:cxnLst>
+              <a:rect l="l" t="t" r="r" b="b"/>
+              <a:pathLst>
+                <a:path w="1098755" h="1486548">
+                  <a:moveTo>
+                    <a:pt x="113750" y="0"/>
+                  </a:moveTo>
+                  <a:cubicBezTo>
+                    <a:pt x="685878" y="190586"/>
+                    <a:pt x="1098755" y="730644"/>
+                    <a:pt x="1098755" y="1366548"/>
+                  </a:cubicBezTo>
+                  <a:lnTo>
+                    <a:pt x="918755" y="1486548"/>
+                  </a:lnTo>
+                  <a:lnTo>
+                    <a:pt x="738755" y="1366548"/>
+                  </a:lnTo>
+                  <a:cubicBezTo>
+                    <a:pt x="738755" y="889620"/>
+                    <a:pt x="429098" y="484577"/>
+                    <a:pt x="0" y="341637"/>
+                  </a:cubicBezTo>
+                  <a:lnTo>
+                    <a:pt x="170754" y="208734"/>
+                  </a:lnTo>
+                  <a:close/>
+                </a:path>
+              </a:pathLst>
+            </a:custGeom>
+          </p:spPr>
+          <p:style>
+            <a:lnRef idx="2">
+              <a:schemeClr val="accent1">
+                <a:shade val="50000"/>
+              </a:schemeClr>
+            </a:lnRef>
+            <a:fillRef idx="1">
+              <a:schemeClr val="accent1"/>
+            </a:fillRef>
+            <a:effectRef idx="0">
+              <a:schemeClr val="accent1"/>
+            </a:effectRef>
+            <a:fontRef idx="minor">
+              <a:schemeClr val="lt1"/>
+            </a:fontRef>
+          </p:style>
+          <p:txBody>
+            <a:bodyPr rtlCol="0" anchor="ctr"/>
+            <a:lstStyle/>
+            <a:p>
+              <a:pPr algn="ctr"/>
+              <a:endParaRPr lang="en-US"/>
+            </a:p>
+          </p:txBody>
+        </p:sp>
+      </p:grpSp>
       <p:sp>
         <p:nvSpPr>
           <p:cNvPr id="4" name="Rechteck 3" hidden="1"/>
@@ -10695,7 +11393,7 @@
         </p:blipFill>
         <p:spPr>
           <a:xfrm>
-            <a:off x="838200" y="1690688"/>
+            <a:off x="1458851" y="2167874"/>
             <a:ext cx="1690093" cy="1325563"/>
           </a:xfrm>
           <a:prstGeom prst="rect">
@@ -10717,7 +11415,7 @@
         </p:nvSpPr>
         <p:spPr>
           <a:xfrm>
-            <a:off x="2604449" y="1753304"/>
+            <a:off x="3225100" y="2230490"/>
             <a:ext cx="3491551" cy="1200329"/>
           </a:xfrm>
           <a:prstGeom prst="rect">
@@ -10952,7 +11650,7 @@
         </p:nvSpPr>
         <p:spPr>
           <a:xfrm>
-            <a:off x="963827" y="2100649"/>
+            <a:off x="1578966" y="2598445"/>
             <a:ext cx="1383957" cy="140043"/>
           </a:xfrm>
           <a:prstGeom prst="rect">

</xml_diff>

<commit_message>
release numbers and changelog
</commit_message>
<xml_diff>
--- a/documentation/Changelog.pptx
+++ b/documentation/Changelog.pptx
@@ -335,7 +335,7 @@
           <a:p>
             <a:fld id="{5EC86055-D2F1-46C3-83FD-A327EBDDB0A8}" type="datetimeFigureOut">
               <a:rPr lang="de-DE" smtClean="0"/>
-              <a:t>11.06.2023</a:t>
+              <a:t>30.08.2023</a:t>
             </a:fld>
             <a:endParaRPr lang="de-DE"/>
           </a:p>
@@ -749,7 +749,7 @@
           <a:p>
             <a:fld id="{83E968C0-E631-4FA5-B66C-A6893089A72C}" type="datetime1">
               <a:rPr lang="de-DE" smtClean="0"/>
-              <a:t>11.06.2023</a:t>
+              <a:t>30.08.2023</a:t>
             </a:fld>
             <a:endParaRPr lang="de-DE"/>
           </a:p>
@@ -947,7 +947,7 @@
           <a:p>
             <a:fld id="{327DFED5-F5BC-4C21-B00D-107757BCB1D5}" type="datetime1">
               <a:rPr lang="de-DE" smtClean="0"/>
-              <a:t>11.06.2023</a:t>
+              <a:t>30.08.2023</a:t>
             </a:fld>
             <a:endParaRPr lang="de-DE"/>
           </a:p>
@@ -1155,7 +1155,7 @@
           <a:p>
             <a:fld id="{D55D80D4-FC22-469B-B760-6A7940AA3138}" type="datetime1">
               <a:rPr lang="de-DE" smtClean="0"/>
-              <a:t>11.06.2023</a:t>
+              <a:t>30.08.2023</a:t>
             </a:fld>
             <a:endParaRPr lang="de-DE"/>
           </a:p>
@@ -1350,7 +1350,7 @@
           <a:p>
             <a:fld id="{146DBEAB-51C5-4FBE-9B54-BC8F608043B0}" type="datetime1">
               <a:rPr lang="de-DE" smtClean="0"/>
-              <a:t>11.06.2023</a:t>
+              <a:t>30.08.2023</a:t>
             </a:fld>
             <a:endParaRPr lang="de-DE" dirty="0"/>
           </a:p>
@@ -1537,7 +1537,7 @@
           <a:p>
             <a:fld id="{B861EB0D-30DD-4E89-8B0D-65B7028FC562}" type="datetime1">
               <a:rPr lang="de-DE" smtClean="0"/>
-              <a:t>11.06.2023</a:t>
+              <a:t>30.08.2023</a:t>
             </a:fld>
             <a:endParaRPr lang="de-DE"/>
           </a:p>
@@ -1812,7 +1812,7 @@
           <a:p>
             <a:fld id="{73CEBF28-F29F-47B0-8445-64F25E1B2731}" type="datetime1">
               <a:rPr lang="de-DE" smtClean="0"/>
-              <a:t>11.06.2023</a:t>
+              <a:t>30.08.2023</a:t>
             </a:fld>
             <a:endParaRPr lang="de-DE"/>
           </a:p>
@@ -2077,7 +2077,7 @@
           <a:p>
             <a:fld id="{70BB8FCB-2F3D-4195-89D6-401F7605A609}" type="datetime1">
               <a:rPr lang="de-DE" smtClean="0"/>
-              <a:t>11.06.2023</a:t>
+              <a:t>30.08.2023</a:t>
             </a:fld>
             <a:endParaRPr lang="de-DE"/>
           </a:p>
@@ -2489,7 +2489,7 @@
           <a:p>
             <a:fld id="{7A814B83-3C3F-4E43-9685-CE4AC483A9CE}" type="datetime1">
               <a:rPr lang="de-DE" smtClean="0"/>
-              <a:t>11.06.2023</a:t>
+              <a:t>30.08.2023</a:t>
             </a:fld>
             <a:endParaRPr lang="de-DE"/>
           </a:p>
@@ -2631,7 +2631,7 @@
           <a:p>
             <a:fld id="{5A2175DA-8D38-4A58-A54F-1168D09756FD}" type="datetime1">
               <a:rPr lang="de-DE" smtClean="0"/>
-              <a:t>11.06.2023</a:t>
+              <a:t>30.08.2023</a:t>
             </a:fld>
             <a:endParaRPr lang="de-DE"/>
           </a:p>
@@ -2744,7 +2744,7 @@
           <a:p>
             <a:fld id="{8F6AF57F-AE76-4C94-AABC-F8C3359A6250}" type="datetime1">
               <a:rPr lang="de-DE" smtClean="0"/>
-              <a:t>11.06.2023</a:t>
+              <a:t>30.08.2023</a:t>
             </a:fld>
             <a:endParaRPr lang="de-DE"/>
           </a:p>
@@ -3055,7 +3055,7 @@
           <a:p>
             <a:fld id="{5582B541-E7EC-488F-97C5-20BBF6BE4B06}" type="datetime1">
               <a:rPr lang="de-DE" smtClean="0"/>
-              <a:t>11.06.2023</a:t>
+              <a:t>30.08.2023</a:t>
             </a:fld>
             <a:endParaRPr lang="de-DE"/>
           </a:p>
@@ -3346,7 +3346,7 @@
           <a:p>
             <a:fld id="{07C6A342-1575-4CB6-868D-A21133827D71}" type="datetime1">
               <a:rPr lang="de-DE" smtClean="0"/>
-              <a:t>11.06.2023</a:t>
+              <a:t>30.08.2023</a:t>
             </a:fld>
             <a:endParaRPr lang="de-DE"/>
           </a:p>
@@ -3696,7 +3696,7 @@
           <a:p>
             <a:fld id="{EC197B76-F97A-42BE-B66C-1432418DB8F2}" type="datetime1">
               <a:rPr lang="de-DE" smtClean="0"/>
-              <a:t>11.06.2023</a:t>
+              <a:t>30.08.2023</a:t>
             </a:fld>
             <a:endParaRPr lang="de-DE"/>
           </a:p>
@@ -34608,6 +34608,53 @@
           <a:p>
             <a:pPr algn="ctr"/>
             <a:endParaRPr lang="en-US"/>
+          </a:p>
+        </p:txBody>
+      </p:sp>
+      <p:sp>
+        <p:nvSpPr>
+          <p:cNvPr id="6" name="Textfeld 5">
+            <a:extLst>
+              <a:ext uri="{FF2B5EF4-FFF2-40B4-BE49-F238E27FC236}">
+                <a16:creationId xmlns:a16="http://schemas.microsoft.com/office/drawing/2014/main" id="{164BECB3-FD2E-9CB4-90D5-351B86C6D439}"/>
+              </a:ext>
+            </a:extLst>
+          </p:cNvPr>
+          <p:cNvSpPr txBox="1"/>
+          <p:nvPr/>
+        </p:nvSpPr>
+        <p:spPr>
+          <a:xfrm>
+            <a:off x="838200" y="4084369"/>
+            <a:ext cx="9546021" cy="646331"/>
+          </a:xfrm>
+          <a:prstGeom prst="rect">
+            <a:avLst/>
+          </a:prstGeom>
+          <a:noFill/>
+        </p:spPr>
+        <p:txBody>
+          <a:bodyPr wrap="square" rtlCol="0">
+            <a:spAutoFit/>
+          </a:bodyPr>
+          <a:lstStyle/>
+          <a:p>
+            <a:pPr marL="285750" indent="-285750">
+              <a:buFont typeface="Wingdings" panose="05000000000000000000" pitchFamily="2" charset="2"/>
+              <a:buChar char="Ø"/>
+            </a:pPr>
+            <a:r>
+              <a:rPr lang="de-DE" dirty="0"/>
+              <a:t>Animationen werden nun bei den Gruppierungs-Funktionen und </a:t>
+            </a:r>
+            <a:r>
+              <a:rPr lang="de-DE" dirty="0" err="1"/>
+              <a:t>Wechselshapes</a:t>
+            </a:r>
+            <a:r>
+              <a:rPr lang="de-DE" dirty="0"/>
+              <a:t> korrekt übertragen</a:t>
+            </a:r>
           </a:p>
         </p:txBody>
       </p:sp>

</xml_diff>